<commit_message>
update to fix security problem
</commit_message>
<xml_diff>
--- a/milestone 4/Fake News Detection.pptx
+++ b/milestone 4/Fake News Detection.pptx
@@ -11581,7 +11581,7 @@
               <a:buNone/>
             </a:pPr>
             <a:r>
-              <a:rPr lang="zh-CN" sz="1300">
+              <a:rPr lang="zh-CN" sz="1300" dirty="0">
                 <a:solidFill>
                   <a:srgbClr val="000000"/>
                 </a:solidFill>
@@ -11590,9 +11590,105 @@
                 <a:cs typeface="Arial"/>
                 <a:sym typeface="Arial"/>
               </a:rPr>
-              <a:t>Traditional RNNs may have problems on long-term dependencies due to the vanishing gradient problem. LSTMs solves this with the structure of input, forget, and output gates. It allow them to retain information over longer periods, which is crucial for understanding the context in news articles. Unlike feedforward networks, LSTMs can model sequences of variable lengths, which is essential in news content where article lengths can vary significantly. In this project, the LSTM structure is a double-layered LSTM with 128 hidden units per layer, incorporating dropout of 0.5 for regularization. The batch size is 64. It processes input features through these LSTM layers, followed by a dropout and a linear layer, to perform binary classification of textual data for fake news detection.</a:t>
+              <a:t>Traditional RNNs may have problems on long-term dependencies due to the vanishing gradient problem. LSTMs solves this with the structure of input, forget, and output gates. It allow</a:t>
             </a:r>
-            <a:endParaRPr sz="1300">
+            <a:r>
+              <a:rPr lang="en-US" altLang="zh-CN" sz="1300" dirty="0">
+                <a:solidFill>
+                  <a:srgbClr val="000000"/>
+                </a:solidFill>
+                <a:latin typeface="Arial"/>
+                <a:ea typeface="Arial"/>
+                <a:cs typeface="Arial"/>
+                <a:sym typeface="Arial"/>
+              </a:rPr>
+              <a:t>s</a:t>
+            </a:r>
+            <a:r>
+              <a:rPr lang="zh-CN" sz="1300" dirty="0">
+                <a:solidFill>
+                  <a:srgbClr val="000000"/>
+                </a:solidFill>
+                <a:latin typeface="Arial"/>
+                <a:ea typeface="Arial"/>
+                <a:cs typeface="Arial"/>
+                <a:sym typeface="Arial"/>
+              </a:rPr>
+              <a:t> them to retain information over longer periods, which is crucial for understanding the context in news articles. Unlike feedforward networks, LSTMs can model sequences of variable lengths, which is essential in news content where article lengths can vary </a:t>
+            </a:r>
+            <a:r>
+              <a:rPr lang="zh-CN" sz="1300">
+                <a:solidFill>
+                  <a:srgbClr val="000000"/>
+                </a:solidFill>
+                <a:latin typeface="Arial"/>
+                <a:ea typeface="Arial"/>
+                <a:cs typeface="Arial"/>
+                <a:sym typeface="Arial"/>
+              </a:rPr>
+              <a:t>significantly</a:t>
+            </a:r>
+            <a:r>
+              <a:rPr lang="en-US" altLang="zh-CN" sz="1300">
+                <a:solidFill>
+                  <a:srgbClr val="000000"/>
+                </a:solidFill>
+                <a:latin typeface="Arial"/>
+                <a:ea typeface="Arial"/>
+                <a:cs typeface="Arial"/>
+                <a:sym typeface="Arial"/>
+              </a:rPr>
+              <a:t> different</a:t>
+            </a:r>
+            <a:r>
+              <a:rPr lang="zh-CN" sz="1300">
+                <a:solidFill>
+                  <a:srgbClr val="000000"/>
+                </a:solidFill>
+                <a:latin typeface="Arial"/>
+                <a:ea typeface="Arial"/>
+                <a:cs typeface="Arial"/>
+                <a:sym typeface="Arial"/>
+              </a:rPr>
+              <a:t>. </a:t>
+            </a:r>
+            <a:r>
+              <a:rPr lang="zh-CN" sz="1300" dirty="0">
+                <a:solidFill>
+                  <a:srgbClr val="000000"/>
+                </a:solidFill>
+                <a:latin typeface="Arial"/>
+                <a:ea typeface="Arial"/>
+                <a:cs typeface="Arial"/>
+                <a:sym typeface="Arial"/>
+              </a:rPr>
+              <a:t>In this project, the </a:t>
+            </a:r>
+            <a:r>
+              <a:rPr lang="en-US" altLang="zh-CN" sz="1300" dirty="0">
+                <a:solidFill>
+                  <a:srgbClr val="000000"/>
+                </a:solidFill>
+                <a:latin typeface="Arial"/>
+                <a:ea typeface="Arial"/>
+                <a:cs typeface="Arial"/>
+                <a:sym typeface="Arial"/>
+              </a:rPr>
+              <a:t>strong baseline</a:t>
+            </a:r>
+            <a:r>
+              <a:rPr lang="zh-CN" sz="1300" dirty="0">
+                <a:solidFill>
+                  <a:srgbClr val="000000"/>
+                </a:solidFill>
+                <a:latin typeface="Arial"/>
+                <a:ea typeface="Arial"/>
+                <a:cs typeface="Arial"/>
+                <a:sym typeface="Arial"/>
+              </a:rPr>
+              <a:t> structure is a double-layered LSTM with 128 hidden units per layer, incorporating dropout of 0.5 for regularization. The batch size is 64. It processes input features through these LSTM layers, followed by a dropout and a linear layer, to perform binary classification for fake news detection.</a:t>
+            </a:r>
+            <a:endParaRPr sz="1300" dirty="0">
               <a:solidFill>
                 <a:srgbClr val="000000"/>
               </a:solidFill>
@@ -11612,7 +11708,7 @@
               </a:spcAft>
               <a:buNone/>
             </a:pPr>
-            <a:endParaRPr/>
+            <a:endParaRPr dirty="0"/>
           </a:p>
         </p:txBody>
       </p:sp>
@@ -11831,7 +11927,31 @@
                 <a:cs typeface="Arial"/>
                 <a:sym typeface="Arial"/>
               </a:rPr>
-              <a:t> from the transformers library to load the tokenizer and model, respectively. For model training, we employed the AdamW optimizer, which introduces weight decay to address potential overfitting issues with Adam in certain cases. The learning rate was set to 2e-5, and weight decay was set to 0.01. Additionally, we used a learning rate scheduler, starting with a small learning rate in the early training stages, gradually increasing it, and then maintaining a relatively stable learning rate in the later stages. This helps improve the model's stability in the early training phase and accelerates convergence in the later stages. We set the warm-up steps to 0.1 times the total steps.</a:t>
+              <a:t> from the transformers library to load the tokenizer and model. For model training, we employed the AdamW optimizer, which introduces weight decay to address potential overfitting issues with Adam in certain cases. The learning rate was set to 2e-5, and weight decay was set to 0.01. Additionally, we used a learning rate scheduler, starting with a small learning rate in the early training stages, gradually increasing it, and then maintaining a relatively stable learning rate in the later stages. This helps improve the model's stability in the early training phase and accelerates convergence in the later stages. We set the warm-up steps to </a:t>
+            </a:r>
+            <a:r>
+              <a:rPr lang="en-US" altLang="zh-CN" sz="1300" dirty="0">
+                <a:solidFill>
+                  <a:srgbClr val="000000"/>
+                </a:solidFill>
+                <a:latin typeface="Arial"/>
+                <a:ea typeface="Arial"/>
+                <a:cs typeface="Arial"/>
+                <a:sym typeface="Arial"/>
+              </a:rPr>
+              <a:t>10 % of </a:t>
+            </a:r>
+            <a:r>
+              <a:rPr lang="zh-CN" sz="1300" dirty="0">
+                <a:solidFill>
+                  <a:srgbClr val="000000"/>
+                </a:solidFill>
+                <a:latin typeface="Arial"/>
+                <a:ea typeface="Arial"/>
+                <a:cs typeface="Arial"/>
+                <a:sym typeface="Arial"/>
+              </a:rPr>
+              <a:t>the total steps.</a:t>
             </a:r>
             <a:endParaRPr sz="1300" dirty="0">
               <a:solidFill>

</xml_diff>